<commit_message>
Updated Task 2 Template.pptx file
</commit_message>
<xml_diff>
--- a/Investment_banking_Projects/Task-2-Target-information-and-auction-process/Task 2 Template.pptx
+++ b/Investment_banking_Projects/Task-2-Target-information-and-auction-process/Task 2 Template.pptx
@@ -10737,7 +10737,7 @@
         <p:spPr>
           <a:xfrm>
             <a:off x="795528" y="246888"/>
-            <a:ext cx="9107424" cy="685800"/>
+            <a:ext cx="9107424" cy="743216"/>
           </a:xfrm>
         </p:spPr>
         <p:txBody>
@@ -10765,12 +10765,33 @@
             <p:ph type="subTitle" idx="10"/>
           </p:nvPr>
         </p:nvSpPr>
-        <p:spPr/>
+        <p:spPr>
+          <a:xfrm>
+            <a:off x="795528" y="1115568"/>
+            <a:ext cx="9107424" cy="396382"/>
+          </a:xfrm>
+        </p:spPr>
         <p:txBody>
           <a:bodyPr/>
           <a:lstStyle/>
           <a:p>
-            <a:endParaRPr lang="en-AU" sz="1400" dirty="0"/>
+            <a:r>
+              <a:rPr lang="en-US" sz="2000" b="1" i="0" dirty="0">
+                <a:solidFill>
+                  <a:schemeClr val="tx1"/>
+                </a:solidFill>
+                <a:effectLst/>
+                <a:latin typeface="Inter"/>
+              </a:rPr>
+              <a:t>Slide 1: Company Overview</a:t>
+            </a:r>
+          </a:p>
+          <a:p>
+            <a:endParaRPr lang="en-AU" sz="1800" dirty="0">
+              <a:solidFill>
+                <a:schemeClr val="tx1"/>
+              </a:solidFill>
+            </a:endParaRPr>
           </a:p>
         </p:txBody>
       </p:sp>
@@ -10788,8 +10809,8 @@
         </p:nvSpPr>
         <p:spPr>
           <a:xfrm>
-            <a:off x="795528" y="1892808"/>
-            <a:ext cx="4279392" cy="1965960"/>
+            <a:off x="795528" y="1892807"/>
+            <a:ext cx="4279392" cy="2874047"/>
           </a:xfrm>
           <a:prstGeom prst="rect">
             <a:avLst/>
@@ -10802,29 +10823,203 @@
           </a:bodyPr>
           <a:lstStyle/>
           <a:p>
-            <a:pPr marL="128016" lvl="1" indent="-128016">
-              <a:lnSpc>
-                <a:spcPct val="110000"/>
-              </a:lnSpc>
+            <a:pPr algn="l">
+              <a:buFont typeface="Arial" panose="020B0604020202020204" pitchFamily="34" charset="0"/>
+              <a:buChar char="•"/>
+            </a:pPr>
+            <a:r>
+              <a:rPr lang="en-US" sz="1200" b="1" i="0" dirty="0">
+                <a:effectLst/>
+                <a:latin typeface="Inter"/>
+              </a:rPr>
+              <a:t>Company Name:</a:t>
+            </a:r>
+            <a:r>
+              <a:rPr lang="en-US" sz="1200" b="0" i="0" dirty="0">
+                <a:effectLst/>
+                <a:latin typeface="Inter"/>
+              </a:rPr>
+              <a:t> HappyHour Co.</a:t>
+            </a:r>
+          </a:p>
+          <a:p>
+            <a:pPr algn="l">
               <a:spcBef>
-                <a:spcPts val="600"/>
+                <a:spcPts val="300"/>
+              </a:spcBef>
+              <a:buFont typeface="Arial" panose="020B0604020202020204" pitchFamily="34" charset="0"/>
+              <a:buChar char="•"/>
+            </a:pPr>
+            <a:r>
+              <a:rPr lang="en-US" sz="1200" b="1" i="0" dirty="0">
+                <a:effectLst/>
+                <a:latin typeface="Inter"/>
+              </a:rPr>
+              <a:t>Headquarters:</a:t>
+            </a:r>
+            <a:r>
+              <a:rPr lang="en-US" sz="1200" b="0" i="0" dirty="0">
+                <a:effectLst/>
+                <a:latin typeface="Inter"/>
+              </a:rPr>
+              <a:t> Singapore</a:t>
+            </a:r>
+          </a:p>
+          <a:p>
+            <a:pPr algn="l">
+              <a:spcBef>
+                <a:spcPts val="300"/>
+              </a:spcBef>
+              <a:buFont typeface="Arial" panose="020B0604020202020204" pitchFamily="34" charset="0"/>
+              <a:buChar char="•"/>
+            </a:pPr>
+            <a:r>
+              <a:rPr lang="en-US" sz="1200" b="1" i="0" dirty="0">
+                <a:effectLst/>
+                <a:latin typeface="Inter"/>
+              </a:rPr>
+              <a:t>Founded:</a:t>
+            </a:r>
+            <a:r>
+              <a:rPr lang="en-US" sz="1200" b="0" i="0" dirty="0">
+                <a:effectLst/>
+                <a:latin typeface="Inter"/>
+              </a:rPr>
+              <a:t> 1975</a:t>
+            </a:r>
+          </a:p>
+          <a:p>
+            <a:pPr algn="l">
+              <a:spcBef>
+                <a:spcPts val="300"/>
+              </a:spcBef>
+              <a:buFont typeface="Arial" panose="020B0604020202020204" pitchFamily="34" charset="0"/>
+              <a:buChar char="•"/>
+            </a:pPr>
+            <a:r>
+              <a:rPr lang="en-US" sz="1200" b="1" i="0" dirty="0">
+                <a:effectLst/>
+                <a:latin typeface="Inter"/>
+              </a:rPr>
+              <a:t>Operations:</a:t>
+            </a:r>
+            <a:r>
+              <a:rPr lang="en-US" sz="1200" b="0" i="0" dirty="0">
+                <a:effectLst/>
+                <a:latin typeface="Inter"/>
+              </a:rPr>
+              <a:t> Beer, spirits, and non-alcoholic beverages</a:t>
+            </a:r>
+          </a:p>
+          <a:p>
+            <a:pPr algn="l">
+              <a:spcBef>
+                <a:spcPts val="300"/>
+              </a:spcBef>
+              <a:buFont typeface="Arial" panose="020B0604020202020204" pitchFamily="34" charset="0"/>
+              <a:buChar char="•"/>
+            </a:pPr>
+            <a:r>
+              <a:rPr lang="en-US" sz="1200" b="1" i="0" dirty="0">
+                <a:effectLst/>
+                <a:latin typeface="Inter"/>
+              </a:rPr>
+              <a:t>Geographies:</a:t>
+            </a:r>
+            <a:r>
+              <a:rPr lang="en-US" sz="1200" b="0" i="0" dirty="0">
+                <a:effectLst/>
+                <a:latin typeface="Inter"/>
+              </a:rPr>
+              <a:t> Singapore, Malaysia, China (expanding to Cambodia)</a:t>
+            </a:r>
+          </a:p>
+          <a:p>
+            <a:pPr algn="l">
+              <a:spcBef>
+                <a:spcPts val="300"/>
               </a:spcBef>
               <a:spcAft>
-                <a:spcPct val="0"/>
+                <a:spcPts val="300"/>
               </a:spcAft>
-              <a:buClr>
-                <a:schemeClr val="bg2"/>
-              </a:buClr>
-              <a:buSzPct val="92000"/>
-              <a:buFont typeface="Wingdings" panose="05000000000000000000" pitchFamily="2" charset="2"/>
-              <a:buChar char="n"/>
+              <a:buFont typeface="Arial" panose="020B0604020202020204" pitchFamily="34" charset="0"/>
+              <a:buChar char="•"/>
             </a:pPr>
-            <a:endParaRPr lang="en-AU" sz="900" dirty="0">
-              <a:solidFill>
-                <a:schemeClr val="tx2"/>
-              </a:solidFill>
-              <a:latin typeface="Arial" panose="020B0604020202020204" pitchFamily="34" charset="0"/>
+            <a:r>
+              <a:rPr lang="en-US" sz="1200" b="1" i="0" dirty="0">
+                <a:effectLst/>
+                <a:latin typeface="Inter"/>
+              </a:rPr>
+              <a:t>Key Strengths:</a:t>
+            </a:r>
+            <a:endParaRPr lang="en-US" sz="1200" b="0" i="0" dirty="0">
+              <a:effectLst/>
+              <a:latin typeface="Inter"/>
             </a:endParaRPr>
+          </a:p>
+          <a:p>
+            <a:pPr marL="742950" lvl="1" indent="-285750" algn="l">
+              <a:spcBef>
+                <a:spcPts val="300"/>
+              </a:spcBef>
+              <a:buFont typeface="Arial" panose="020B0604020202020204" pitchFamily="34" charset="0"/>
+              <a:buChar char="•"/>
+            </a:pPr>
+            <a:r>
+              <a:rPr lang="en-US" sz="1200" b="0" i="0" dirty="0">
+                <a:effectLst/>
+                <a:latin typeface="Inter"/>
+              </a:rPr>
+              <a:t>#1 player in beer and spirits in Singapore &amp; Malaysia</a:t>
+            </a:r>
+          </a:p>
+          <a:p>
+            <a:pPr marL="742950" lvl="1" indent="-285750" algn="l">
+              <a:spcBef>
+                <a:spcPts val="300"/>
+              </a:spcBef>
+              <a:buFont typeface="Arial" panose="020B0604020202020204" pitchFamily="34" charset="0"/>
+              <a:buChar char="•"/>
+            </a:pPr>
+            <a:r>
+              <a:rPr lang="en-US" sz="1200" b="0" i="0" dirty="0">
+                <a:effectLst/>
+                <a:latin typeface="Inter"/>
+              </a:rPr>
+              <a:t>#1 player in non-alcoholic beverages in Malaysia</a:t>
+            </a:r>
+          </a:p>
+          <a:p>
+            <a:pPr marL="742950" lvl="1" indent="-285750" algn="l">
+              <a:spcBef>
+                <a:spcPts val="300"/>
+              </a:spcBef>
+              <a:buFont typeface="Arial" panose="020B0604020202020204" pitchFamily="34" charset="0"/>
+              <a:buChar char="•"/>
+            </a:pPr>
+            <a:r>
+              <a:rPr lang="en-US" sz="1200" b="0" i="0" dirty="0">
+                <a:effectLst/>
+                <a:latin typeface="Inter"/>
+              </a:rPr>
+              <a:t>Strong supply chain and distributor relationships</a:t>
+            </a:r>
+          </a:p>
+          <a:p>
+            <a:pPr marL="742950" lvl="1" indent="-285750" algn="l">
+              <a:spcBef>
+                <a:spcPts val="300"/>
+              </a:spcBef>
+              <a:buFont typeface="Arial" panose="020B0604020202020204" pitchFamily="34" charset="0"/>
+              <a:buChar char="•"/>
+            </a:pPr>
+            <a:r>
+              <a:rPr lang="en-US" sz="1200" b="0" i="0" dirty="0">
+                <a:effectLst/>
+                <a:latin typeface="Inter"/>
+              </a:rPr>
+              <a:t>Premium product offerings in spirits segment</a:t>
+            </a:r>
           </a:p>
         </p:txBody>
       </p:sp>
@@ -10837,7 +11032,7 @@
         <p:spPr>
           <a:xfrm>
             <a:off x="795528" y="1645920"/>
-            <a:ext cx="4279392" cy="246888"/>
+            <a:ext cx="4279392" cy="267558"/>
           </a:xfrm>
           <a:prstGeom prst="rect">
             <a:avLst/>
@@ -10860,7 +11055,7 @@
           <a:lstStyle/>
           <a:p>
             <a:r>
-              <a:rPr lang="en-AU" b="1" dirty="0">
+              <a:rPr lang="en-AU" sz="1600" b="1" dirty="0">
                 <a:latin typeface="Arial" panose="020B0604020202020204" pitchFamily="34" charset="0"/>
               </a:rPr>
               <a:t>Overview</a:t>
@@ -10876,8 +11071,8 @@
         </p:nvSpPr>
         <p:spPr>
           <a:xfrm>
-            <a:off x="795528" y="4160520"/>
-            <a:ext cx="4279392" cy="246888"/>
+            <a:off x="795528" y="4887172"/>
+            <a:ext cx="4279392" cy="287397"/>
           </a:xfrm>
           <a:prstGeom prst="rect">
             <a:avLst/>
@@ -10900,7 +11095,7 @@
           <a:lstStyle/>
           <a:p>
             <a:r>
-              <a:rPr lang="en-AU" b="1" dirty="0">
+              <a:rPr lang="en-AU" sz="1600" b="1" dirty="0">
                 <a:latin typeface="Arial" panose="020B0604020202020204" pitchFamily="34" charset="0"/>
               </a:rPr>
               <a:t>Shareholders</a:t>
@@ -10918,8 +11113,8 @@
         </p:nvSpPr>
         <p:spPr>
           <a:xfrm>
-            <a:off x="5623561" y="4556304"/>
-            <a:ext cx="4279391" cy="246888"/>
+            <a:off x="5623561" y="4887172"/>
+            <a:ext cx="4279391" cy="287397"/>
           </a:xfrm>
           <a:prstGeom prst="rect">
             <a:avLst/>
@@ -10942,7 +11137,7 @@
           <a:lstStyle/>
           <a:p>
             <a:r>
-              <a:rPr lang="en-AU" b="1" dirty="0">
+              <a:rPr lang="en-AU" sz="1600" b="1" dirty="0">
                 <a:latin typeface="Arial" panose="020B0604020202020204" pitchFamily="34" charset="0"/>
               </a:rPr>
               <a:t>Indicative valuation</a:t>
@@ -11001,8 +11196,8 @@
         </p:nvSpPr>
         <p:spPr>
           <a:xfrm>
-            <a:off x="5623560" y="1645920"/>
-            <a:ext cx="4279391" cy="246888"/>
+            <a:off x="5623560" y="1548916"/>
+            <a:ext cx="4279391" cy="313526"/>
           </a:xfrm>
           <a:prstGeom prst="rect">
             <a:avLst/>
@@ -11025,10 +11220,10 @@
           <a:lstStyle/>
           <a:p>
             <a:r>
-              <a:rPr lang="en-AU" b="1" dirty="0">
+              <a:rPr lang="en-AU" sz="1600" b="1" dirty="0">
                 <a:latin typeface="Arial" panose="020B0604020202020204" pitchFamily="34" charset="0"/>
               </a:rPr>
-              <a:t>Key financials</a:t>
+              <a:t>Key financials(US $mm)</a:t>
             </a:r>
           </a:p>
         </p:txBody>
@@ -11042,7 +11237,7 @@
         <p:grpSpPr>
           <a:xfrm>
             <a:off x="9457671" y="487407"/>
-            <a:ext cx="445281" cy="445281"/>
+            <a:ext cx="445281" cy="482560"/>
             <a:chOff x="7791881" y="273464"/>
             <a:chExt cx="864014" cy="864014"/>
           </a:xfrm>
@@ -11663,8 +11858,8 @@
         </p:nvSpPr>
         <p:spPr>
           <a:xfrm>
-            <a:off x="5234940" y="6903720"/>
-            <a:ext cx="228600" cy="182880"/>
+            <a:off x="5234940" y="6903719"/>
+            <a:ext cx="228600" cy="198191"/>
           </a:xfrm>
           <a:prstGeom prst="rect">
             <a:avLst/>
@@ -11691,6 +11886,1330 @@
               </a:rPr>
               <a:t>1</a:t>
             </a:r>
+          </a:p>
+        </p:txBody>
+      </p:sp>
+      <p:sp>
+        <p:nvSpPr>
+          <p:cNvPr id="69" name="TextBox 68">
+            <a:extLst>
+              <a:ext uri="{FF2B5EF4-FFF2-40B4-BE49-F238E27FC236}">
+                <a16:creationId xmlns:a16="http://schemas.microsoft.com/office/drawing/2014/main" id="{9804CA20-3D32-1D44-E717-17A9AA87B737}"/>
+              </a:ext>
+            </a:extLst>
+          </p:cNvPr>
+          <p:cNvSpPr txBox="1">
+            <a:spLocks/>
+          </p:cNvSpPr>
+          <p:nvPr>
+            <p:custDataLst>
+              <p:tags r:id="rId4"/>
+            </p:custDataLst>
+          </p:nvPr>
+        </p:nvSpPr>
+        <p:spPr>
+          <a:xfrm>
+            <a:off x="5546023" y="1892808"/>
+            <a:ext cx="4279392" cy="2130552"/>
+          </a:xfrm>
+          <a:prstGeom prst="rect">
+            <a:avLst/>
+          </a:prstGeom>
+          <a:noFill/>
+        </p:spPr>
+        <p:txBody>
+          <a:bodyPr vert="horz" wrap="square" lIns="91440" tIns="36576" rIns="36576" bIns="36576" rtlCol="0" anchor="t">
+            <a:noAutofit/>
+          </a:bodyPr>
+          <a:lstStyle/>
+          <a:p>
+            <a:pPr algn="l">
+              <a:buFont typeface="Arial" panose="020B0604020202020204" pitchFamily="34" charset="0"/>
+              <a:buChar char="•"/>
+            </a:pPr>
+            <a:endParaRPr lang="en-US" b="0" i="0" dirty="0">
+              <a:effectLst/>
+              <a:latin typeface="Inter"/>
+            </a:endParaRPr>
+          </a:p>
+        </p:txBody>
+      </p:sp>
+      <p:sp>
+        <p:nvSpPr>
+          <p:cNvPr id="70" name="TextBox 69">
+            <a:extLst>
+              <a:ext uri="{FF2B5EF4-FFF2-40B4-BE49-F238E27FC236}">
+                <a16:creationId xmlns:a16="http://schemas.microsoft.com/office/drawing/2014/main" id="{67282DA4-D747-FB93-D8AF-4377C522EACC}"/>
+              </a:ext>
+            </a:extLst>
+          </p:cNvPr>
+          <p:cNvSpPr txBox="1">
+            <a:spLocks/>
+          </p:cNvSpPr>
+          <p:nvPr>
+            <p:custDataLst>
+              <p:tags r:id="rId5"/>
+            </p:custDataLst>
+          </p:nvPr>
+        </p:nvSpPr>
+        <p:spPr>
+          <a:xfrm>
+            <a:off x="717991" y="5288701"/>
+            <a:ext cx="4279392" cy="1202246"/>
+          </a:xfrm>
+          <a:prstGeom prst="rect">
+            <a:avLst/>
+          </a:prstGeom>
+          <a:noFill/>
+        </p:spPr>
+        <p:txBody>
+          <a:bodyPr vert="horz" wrap="square" lIns="91440" tIns="36576" rIns="36576" bIns="36576" rtlCol="0" anchor="t">
+            <a:noAutofit/>
+          </a:bodyPr>
+          <a:lstStyle/>
+          <a:p>
+            <a:pPr algn="l">
+              <a:buFont typeface="Arial" panose="020B0604020202020204" pitchFamily="34" charset="0"/>
+              <a:buChar char="•"/>
+            </a:pPr>
+            <a:r>
+              <a:rPr lang="en-US" sz="1600" b="1" i="0" dirty="0">
+                <a:effectLst/>
+                <a:latin typeface="Inter"/>
+              </a:rPr>
+              <a:t>Happy Family (Ms. Happy):</a:t>
+            </a:r>
+            <a:r>
+              <a:rPr lang="en-US" sz="1600" b="0" i="0" dirty="0">
+                <a:effectLst/>
+                <a:latin typeface="Inter"/>
+              </a:rPr>
+              <a:t> 60% (seeking to sell)</a:t>
+            </a:r>
+          </a:p>
+          <a:p>
+            <a:pPr algn="l">
+              <a:spcBef>
+                <a:spcPts val="300"/>
+              </a:spcBef>
+              <a:buFont typeface="Arial" panose="020B0604020202020204" pitchFamily="34" charset="0"/>
+              <a:buChar char="•"/>
+            </a:pPr>
+            <a:r>
+              <a:rPr lang="en-US" sz="1600" b="1" i="0" dirty="0">
+                <a:effectLst/>
+                <a:latin typeface="Inter"/>
+              </a:rPr>
+              <a:t>Hour Family:</a:t>
+            </a:r>
+            <a:r>
+              <a:rPr lang="en-US" sz="1600" b="0" i="0" dirty="0">
+                <a:effectLst/>
+                <a:latin typeface="Inter"/>
+              </a:rPr>
+              <a:t> 20%</a:t>
+            </a:r>
+          </a:p>
+          <a:p>
+            <a:pPr algn="l">
+              <a:spcBef>
+                <a:spcPts val="300"/>
+              </a:spcBef>
+              <a:buFont typeface="Arial" panose="020B0604020202020204" pitchFamily="34" charset="0"/>
+              <a:buChar char="•"/>
+            </a:pPr>
+            <a:r>
+              <a:rPr lang="en-US" sz="1600" b="1" i="0" dirty="0">
+                <a:effectLst/>
+                <a:latin typeface="Inter"/>
+              </a:rPr>
+              <a:t>Co Family:</a:t>
+            </a:r>
+            <a:r>
+              <a:rPr lang="en-US" sz="1600" b="0" i="0" dirty="0">
+                <a:effectLst/>
+                <a:latin typeface="Inter"/>
+              </a:rPr>
+              <a:t> 20%</a:t>
+            </a:r>
+          </a:p>
+        </p:txBody>
+      </p:sp>
+      <p:sp>
+        <p:nvSpPr>
+          <p:cNvPr id="71" name="TextBox 70">
+            <a:extLst>
+              <a:ext uri="{FF2B5EF4-FFF2-40B4-BE49-F238E27FC236}">
+                <a16:creationId xmlns:a16="http://schemas.microsoft.com/office/drawing/2014/main" id="{6228256A-A6E0-FC6F-87E5-EBC228E281A0}"/>
+              </a:ext>
+            </a:extLst>
+          </p:cNvPr>
+          <p:cNvSpPr txBox="1">
+            <a:spLocks/>
+          </p:cNvSpPr>
+          <p:nvPr>
+            <p:custDataLst>
+              <p:tags r:id="rId6"/>
+            </p:custDataLst>
+          </p:nvPr>
+        </p:nvSpPr>
+        <p:spPr>
+          <a:xfrm>
+            <a:off x="5546023" y="5288701"/>
+            <a:ext cx="4279392" cy="1337610"/>
+          </a:xfrm>
+          <a:prstGeom prst="rect">
+            <a:avLst/>
+          </a:prstGeom>
+          <a:noFill/>
+        </p:spPr>
+        <p:txBody>
+          <a:bodyPr vert="horz" wrap="square" lIns="91440" tIns="36576" rIns="36576" bIns="36576" rtlCol="0" anchor="t">
+            <a:noAutofit/>
+          </a:bodyPr>
+          <a:lstStyle/>
+          <a:p>
+            <a:pPr algn="l">
+              <a:buFont typeface="Arial" panose="020B0604020202020204" pitchFamily="34" charset="0"/>
+              <a:buChar char="•"/>
+            </a:pPr>
+            <a:r>
+              <a:rPr lang="en-US" sz="1600" b="1" i="0" dirty="0">
+                <a:effectLst/>
+                <a:latin typeface="Inter"/>
+              </a:rPr>
+              <a:t>Valuation Range (EV/EBITDA):</a:t>
+            </a:r>
+            <a:r>
+              <a:rPr lang="en-US" sz="1600" b="0" i="0" dirty="0">
+                <a:effectLst/>
+                <a:latin typeface="Inter"/>
+              </a:rPr>
+              <a:t> 10.0x – 11.5x</a:t>
+            </a:r>
+          </a:p>
+          <a:p>
+            <a:pPr algn="l">
+              <a:spcBef>
+                <a:spcPts val="300"/>
+              </a:spcBef>
+              <a:buFont typeface="Arial" panose="020B0604020202020204" pitchFamily="34" charset="0"/>
+              <a:buChar char="•"/>
+            </a:pPr>
+            <a:r>
+              <a:rPr lang="en-US" sz="1600" b="1" i="0" dirty="0">
+                <a:effectLst/>
+                <a:latin typeface="Inter"/>
+              </a:rPr>
+              <a:t>Implied Enterprise Value:</a:t>
+            </a:r>
+            <a:r>
+              <a:rPr lang="en-US" sz="1600" b="0" i="0" dirty="0">
+                <a:effectLst/>
+                <a:latin typeface="Inter"/>
+              </a:rPr>
+              <a:t> ~US</a:t>
+            </a:r>
+            <a:r>
+              <a:rPr lang="en-US" sz="1600" b="0" i="0" dirty="0">
+                <a:effectLst/>
+                <a:latin typeface="KaTeX_Main"/>
+              </a:rPr>
+              <a:t>3,000mm–US3,000</a:t>
+            </a:r>
+            <a:r>
+              <a:rPr lang="en-US" sz="1600" b="0" i="1" dirty="0">
+                <a:effectLst/>
+                <a:latin typeface="KaTeX_Math"/>
+              </a:rPr>
+              <a:t>mm</a:t>
+            </a:r>
+            <a:r>
+              <a:rPr lang="en-US" sz="1600" b="0" i="0" dirty="0">
+                <a:effectLst/>
+                <a:latin typeface="KaTeX_Main"/>
+              </a:rPr>
+              <a:t>–</a:t>
+            </a:r>
+            <a:r>
+              <a:rPr lang="en-US" sz="1600" b="0" i="1" dirty="0">
+                <a:effectLst/>
+                <a:latin typeface="KaTeX_Math"/>
+              </a:rPr>
+              <a:t>US</a:t>
+            </a:r>
+            <a:r>
+              <a:rPr lang="en-US" sz="1600" b="0" i="0" dirty="0">
+                <a:effectLst/>
+                <a:latin typeface="Inter"/>
+              </a:rPr>
+              <a:t>3,450mm</a:t>
+            </a:r>
+          </a:p>
+          <a:p>
+            <a:pPr algn="l">
+              <a:spcBef>
+                <a:spcPts val="300"/>
+              </a:spcBef>
+              <a:buFont typeface="Arial" panose="020B0604020202020204" pitchFamily="34" charset="0"/>
+              <a:buChar char="•"/>
+            </a:pPr>
+            <a:r>
+              <a:rPr lang="en-US" sz="1600" b="1" i="0" dirty="0">
+                <a:effectLst/>
+                <a:latin typeface="Inter"/>
+              </a:rPr>
+              <a:t>Rumored Preliminary Valuation:</a:t>
+            </a:r>
+            <a:r>
+              <a:rPr lang="en-US" sz="1600" b="0" i="0" dirty="0">
+                <a:effectLst/>
+                <a:latin typeface="Inter"/>
+              </a:rPr>
+              <a:t> US$3,500mm</a:t>
+            </a:r>
+          </a:p>
+        </p:txBody>
+      </p:sp>
+      <p:graphicFrame>
+        <p:nvGraphicFramePr>
+          <p:cNvPr id="72" name="Table 71">
+            <a:extLst>
+              <a:ext uri="{FF2B5EF4-FFF2-40B4-BE49-F238E27FC236}">
+                <a16:creationId xmlns:a16="http://schemas.microsoft.com/office/drawing/2014/main" id="{6A706CF7-C3F9-FDD7-1920-6BC851B27091}"/>
+              </a:ext>
+            </a:extLst>
+          </p:cNvPr>
+          <p:cNvGraphicFramePr>
+            <a:graphicFrameLocks noGrp="1"/>
+          </p:cNvGraphicFramePr>
+          <p:nvPr>
+            <p:extLst>
+              <p:ext uri="{D42A27DB-BD31-4B8C-83A1-F6EECF244321}">
+                <p14:modId xmlns:p14="http://schemas.microsoft.com/office/powerpoint/2010/main" val="1511698337"/>
+              </p:ext>
+            </p:extLst>
+          </p:nvPr>
+        </p:nvGraphicFramePr>
+        <p:xfrm>
+          <a:off x="5613720" y="1926792"/>
+          <a:ext cx="4668016" cy="2874046"/>
+        </p:xfrm>
+        <a:graphic>
+          <a:graphicData uri="http://schemas.openxmlformats.org/drawingml/2006/table">
+            <a:tbl>
+              <a:tblPr/>
+              <a:tblGrid>
+                <a:gridCol w="1167004">
+                  <a:extLst>
+                    <a:ext uri="{9D8B030D-6E8A-4147-A177-3AD203B41FA5}">
+                      <a16:colId xmlns:a16="http://schemas.microsoft.com/office/drawing/2014/main" val="3192704524"/>
+                    </a:ext>
+                  </a:extLst>
+                </a:gridCol>
+                <a:gridCol w="1167004">
+                  <a:extLst>
+                    <a:ext uri="{9D8B030D-6E8A-4147-A177-3AD203B41FA5}">
+                      <a16:colId xmlns:a16="http://schemas.microsoft.com/office/drawing/2014/main" val="3132880757"/>
+                    </a:ext>
+                  </a:extLst>
+                </a:gridCol>
+                <a:gridCol w="1167004">
+                  <a:extLst>
+                    <a:ext uri="{9D8B030D-6E8A-4147-A177-3AD203B41FA5}">
+                      <a16:colId xmlns:a16="http://schemas.microsoft.com/office/drawing/2014/main" val="1551166054"/>
+                    </a:ext>
+                  </a:extLst>
+                </a:gridCol>
+                <a:gridCol w="1167004">
+                  <a:extLst>
+                    <a:ext uri="{9D8B030D-6E8A-4147-A177-3AD203B41FA5}">
+                      <a16:colId xmlns:a16="http://schemas.microsoft.com/office/drawing/2014/main" val="2482853965"/>
+                    </a:ext>
+                  </a:extLst>
+                </a:gridCol>
+              </a:tblGrid>
+              <a:tr h="475941">
+                <a:tc>
+                  <a:txBody>
+                    <a:bodyPr/>
+                    <a:lstStyle/>
+                    <a:p>
+                      <a:pPr algn="l"/>
+                      <a:r>
+                        <a:rPr lang="en-US" sz="1200" b="1" dirty="0">
+                          <a:solidFill>
+                            <a:schemeClr val="tx1"/>
+                          </a:solidFill>
+                          <a:effectLst/>
+                        </a:rPr>
+                        <a:t>Metric</a:t>
+                      </a:r>
+                    </a:p>
+                  </a:txBody>
+                  <a:tcPr anchor="ctr">
+                    <a:lnL>
+                      <a:noFill/>
+                    </a:lnL>
+                    <a:lnR>
+                      <a:noFill/>
+                    </a:lnR>
+                    <a:lnT>
+                      <a:noFill/>
+                    </a:lnT>
+                    <a:lnB>
+                      <a:noFill/>
+                    </a:lnB>
+                    <a:solidFill>
+                      <a:schemeClr val="bg1"/>
+                    </a:solidFill>
+                  </a:tcPr>
+                </a:tc>
+                <a:tc>
+                  <a:txBody>
+                    <a:bodyPr/>
+                    <a:lstStyle/>
+                    <a:p>
+                      <a:pPr algn="l"/>
+                      <a:r>
+                        <a:rPr lang="en-US" sz="1200" b="1">
+                          <a:solidFill>
+                            <a:schemeClr val="tx1"/>
+                          </a:solidFill>
+                          <a:effectLst/>
+                        </a:rPr>
+                        <a:t>FY18A</a:t>
+                      </a:r>
+                    </a:p>
+                  </a:txBody>
+                  <a:tcPr anchor="ctr">
+                    <a:lnL>
+                      <a:noFill/>
+                    </a:lnL>
+                    <a:lnR>
+                      <a:noFill/>
+                    </a:lnR>
+                    <a:lnT>
+                      <a:noFill/>
+                    </a:lnT>
+                    <a:lnB>
+                      <a:noFill/>
+                    </a:lnB>
+                    <a:solidFill>
+                      <a:schemeClr val="bg1"/>
+                    </a:solidFill>
+                  </a:tcPr>
+                </a:tc>
+                <a:tc>
+                  <a:txBody>
+                    <a:bodyPr/>
+                    <a:lstStyle/>
+                    <a:p>
+                      <a:pPr algn="l"/>
+                      <a:r>
+                        <a:rPr lang="en-US" sz="1200" b="1">
+                          <a:solidFill>
+                            <a:schemeClr val="tx1"/>
+                          </a:solidFill>
+                          <a:effectLst/>
+                        </a:rPr>
+                        <a:t>FY19A</a:t>
+                      </a:r>
+                    </a:p>
+                  </a:txBody>
+                  <a:tcPr anchor="ctr">
+                    <a:lnL>
+                      <a:noFill/>
+                    </a:lnL>
+                    <a:lnR>
+                      <a:noFill/>
+                    </a:lnR>
+                    <a:lnT>
+                      <a:noFill/>
+                    </a:lnT>
+                    <a:lnB>
+                      <a:noFill/>
+                    </a:lnB>
+                    <a:solidFill>
+                      <a:schemeClr val="bg1"/>
+                    </a:solidFill>
+                  </a:tcPr>
+                </a:tc>
+                <a:tc>
+                  <a:txBody>
+                    <a:bodyPr/>
+                    <a:lstStyle/>
+                    <a:p>
+                      <a:pPr algn="l"/>
+                      <a:r>
+                        <a:rPr lang="en-US" sz="1200" b="1">
+                          <a:solidFill>
+                            <a:schemeClr val="tx1"/>
+                          </a:solidFill>
+                          <a:effectLst/>
+                        </a:rPr>
+                        <a:t>FY20E</a:t>
+                      </a:r>
+                    </a:p>
+                  </a:txBody>
+                  <a:tcPr anchor="ctr">
+                    <a:lnL>
+                      <a:noFill/>
+                    </a:lnL>
+                    <a:lnR>
+                      <a:noFill/>
+                    </a:lnR>
+                    <a:lnT>
+                      <a:noFill/>
+                    </a:lnT>
+                    <a:lnB>
+                      <a:noFill/>
+                    </a:lnB>
+                    <a:solidFill>
+                      <a:schemeClr val="bg1"/>
+                    </a:solidFill>
+                  </a:tcPr>
+                </a:tc>
+                <a:extLst>
+                  <a:ext uri="{0D108BD9-81ED-4DB2-BD59-A6C34878D82A}">
+                    <a16:rowId xmlns:a16="http://schemas.microsoft.com/office/drawing/2014/main" val="3219934263"/>
+                  </a:ext>
+                </a:extLst>
+              </a:tr>
+              <a:tr h="475941">
+                <a:tc>
+                  <a:txBody>
+                    <a:bodyPr/>
+                    <a:lstStyle/>
+                    <a:p>
+                      <a:r>
+                        <a:rPr lang="en-US" sz="1200">
+                          <a:solidFill>
+                            <a:schemeClr val="tx1"/>
+                          </a:solidFill>
+                          <a:effectLst/>
+                        </a:rPr>
+                        <a:t>Revenue</a:t>
+                      </a:r>
+                    </a:p>
+                  </a:txBody>
+                  <a:tcPr anchor="ctr">
+                    <a:lnL>
+                      <a:noFill/>
+                    </a:lnL>
+                    <a:lnR>
+                      <a:noFill/>
+                    </a:lnR>
+                    <a:lnT>
+                      <a:noFill/>
+                    </a:lnT>
+                    <a:lnB>
+                      <a:noFill/>
+                    </a:lnB>
+                    <a:solidFill>
+                      <a:schemeClr val="bg1"/>
+                    </a:solidFill>
+                  </a:tcPr>
+                </a:tc>
+                <a:tc>
+                  <a:txBody>
+                    <a:bodyPr/>
+                    <a:lstStyle/>
+                    <a:p>
+                      <a:r>
+                        <a:rPr lang="en-US" sz="1200" dirty="0">
+                          <a:solidFill>
+                            <a:schemeClr val="tx1"/>
+                          </a:solidFill>
+                          <a:effectLst/>
+                        </a:rPr>
+                        <a:t>900</a:t>
+                      </a:r>
+                    </a:p>
+                  </a:txBody>
+                  <a:tcPr anchor="ctr">
+                    <a:lnL>
+                      <a:noFill/>
+                    </a:lnL>
+                    <a:lnR>
+                      <a:noFill/>
+                    </a:lnR>
+                    <a:lnT>
+                      <a:noFill/>
+                    </a:lnT>
+                    <a:lnB>
+                      <a:noFill/>
+                    </a:lnB>
+                    <a:solidFill>
+                      <a:schemeClr val="bg1"/>
+                    </a:solidFill>
+                  </a:tcPr>
+                </a:tc>
+                <a:tc>
+                  <a:txBody>
+                    <a:bodyPr/>
+                    <a:lstStyle/>
+                    <a:p>
+                      <a:r>
+                        <a:rPr lang="en-US" sz="1200">
+                          <a:solidFill>
+                            <a:schemeClr val="tx1"/>
+                          </a:solidFill>
+                          <a:effectLst/>
+                        </a:rPr>
+                        <a:t>961</a:t>
+                      </a:r>
+                    </a:p>
+                  </a:txBody>
+                  <a:tcPr anchor="ctr">
+                    <a:lnL>
+                      <a:noFill/>
+                    </a:lnL>
+                    <a:lnR>
+                      <a:noFill/>
+                    </a:lnR>
+                    <a:lnT>
+                      <a:noFill/>
+                    </a:lnT>
+                    <a:lnB>
+                      <a:noFill/>
+                    </a:lnB>
+                    <a:solidFill>
+                      <a:schemeClr val="bg1"/>
+                    </a:solidFill>
+                  </a:tcPr>
+                </a:tc>
+                <a:tc>
+                  <a:txBody>
+                    <a:bodyPr/>
+                    <a:lstStyle/>
+                    <a:p>
+                      <a:r>
+                        <a:rPr lang="en-US" sz="1200" dirty="0">
+                          <a:solidFill>
+                            <a:schemeClr val="tx1"/>
+                          </a:solidFill>
+                          <a:effectLst/>
+                        </a:rPr>
+                        <a:t>1,071</a:t>
+                      </a:r>
+                    </a:p>
+                  </a:txBody>
+                  <a:tcPr anchor="ctr">
+                    <a:lnL>
+                      <a:noFill/>
+                    </a:lnL>
+                    <a:lnR>
+                      <a:noFill/>
+                    </a:lnR>
+                    <a:lnT>
+                      <a:noFill/>
+                    </a:lnT>
+                    <a:lnB>
+                      <a:noFill/>
+                    </a:lnB>
+                    <a:solidFill>
+                      <a:schemeClr val="bg1"/>
+                    </a:solidFill>
+                  </a:tcPr>
+                </a:tc>
+                <a:extLst>
+                  <a:ext uri="{0D108BD9-81ED-4DB2-BD59-A6C34878D82A}">
+                    <a16:rowId xmlns:a16="http://schemas.microsoft.com/office/drawing/2014/main" val="437608611"/>
+                  </a:ext>
+                </a:extLst>
+              </a:tr>
+              <a:tr h="475941">
+                <a:tc>
+                  <a:txBody>
+                    <a:bodyPr/>
+                    <a:lstStyle/>
+                    <a:p>
+                      <a:r>
+                        <a:rPr lang="en-US" sz="1200">
+                          <a:solidFill>
+                            <a:schemeClr val="tx1"/>
+                          </a:solidFill>
+                          <a:effectLst/>
+                        </a:rPr>
+                        <a:t>EBITDA</a:t>
+                      </a:r>
+                    </a:p>
+                  </a:txBody>
+                  <a:tcPr anchor="ctr">
+                    <a:lnL>
+                      <a:noFill/>
+                    </a:lnL>
+                    <a:lnR>
+                      <a:noFill/>
+                    </a:lnR>
+                    <a:lnT>
+                      <a:noFill/>
+                    </a:lnT>
+                    <a:lnB>
+                      <a:noFill/>
+                    </a:lnB>
+                    <a:solidFill>
+                      <a:schemeClr val="bg1"/>
+                    </a:solidFill>
+                  </a:tcPr>
+                </a:tc>
+                <a:tc>
+                  <a:txBody>
+                    <a:bodyPr/>
+                    <a:lstStyle/>
+                    <a:p>
+                      <a:r>
+                        <a:rPr lang="en-US" sz="1200">
+                          <a:solidFill>
+                            <a:schemeClr val="tx1"/>
+                          </a:solidFill>
+                          <a:effectLst/>
+                        </a:rPr>
+                        <a:t>225</a:t>
+                      </a:r>
+                    </a:p>
+                  </a:txBody>
+                  <a:tcPr anchor="ctr">
+                    <a:lnL>
+                      <a:noFill/>
+                    </a:lnL>
+                    <a:lnR>
+                      <a:noFill/>
+                    </a:lnR>
+                    <a:lnT>
+                      <a:noFill/>
+                    </a:lnT>
+                    <a:lnB>
+                      <a:noFill/>
+                    </a:lnB>
+                    <a:solidFill>
+                      <a:schemeClr val="bg1"/>
+                    </a:solidFill>
+                  </a:tcPr>
+                </a:tc>
+                <a:tc>
+                  <a:txBody>
+                    <a:bodyPr/>
+                    <a:lstStyle/>
+                    <a:p>
+                      <a:r>
+                        <a:rPr lang="en-US" sz="1200" dirty="0">
+                          <a:solidFill>
+                            <a:schemeClr val="tx1"/>
+                          </a:solidFill>
+                          <a:effectLst/>
+                        </a:rPr>
+                        <a:t>250</a:t>
+                      </a:r>
+                    </a:p>
+                  </a:txBody>
+                  <a:tcPr anchor="ctr">
+                    <a:lnL>
+                      <a:noFill/>
+                    </a:lnL>
+                    <a:lnR>
+                      <a:noFill/>
+                    </a:lnR>
+                    <a:lnT>
+                      <a:noFill/>
+                    </a:lnT>
+                    <a:lnB>
+                      <a:noFill/>
+                    </a:lnB>
+                    <a:solidFill>
+                      <a:schemeClr val="bg1"/>
+                    </a:solidFill>
+                  </a:tcPr>
+                </a:tc>
+                <a:tc>
+                  <a:txBody>
+                    <a:bodyPr/>
+                    <a:lstStyle/>
+                    <a:p>
+                      <a:r>
+                        <a:rPr lang="en-US" sz="1200">
+                          <a:solidFill>
+                            <a:schemeClr val="tx1"/>
+                          </a:solidFill>
+                          <a:effectLst/>
+                        </a:rPr>
+                        <a:t>300</a:t>
+                      </a:r>
+                    </a:p>
+                  </a:txBody>
+                  <a:tcPr anchor="ctr">
+                    <a:lnL>
+                      <a:noFill/>
+                    </a:lnL>
+                    <a:lnR>
+                      <a:noFill/>
+                    </a:lnR>
+                    <a:lnT>
+                      <a:noFill/>
+                    </a:lnT>
+                    <a:lnB>
+                      <a:noFill/>
+                    </a:lnB>
+                    <a:solidFill>
+                      <a:schemeClr val="bg1"/>
+                    </a:solidFill>
+                  </a:tcPr>
+                </a:tc>
+                <a:extLst>
+                  <a:ext uri="{0D108BD9-81ED-4DB2-BD59-A6C34878D82A}">
+                    <a16:rowId xmlns:a16="http://schemas.microsoft.com/office/drawing/2014/main" val="941032791"/>
+                  </a:ext>
+                </a:extLst>
+              </a:tr>
+              <a:tr h="475941">
+                <a:tc>
+                  <a:txBody>
+                    <a:bodyPr/>
+                    <a:lstStyle/>
+                    <a:p>
+                      <a:r>
+                        <a:rPr lang="en-US" sz="1200">
+                          <a:solidFill>
+                            <a:schemeClr val="tx1"/>
+                          </a:solidFill>
+                          <a:effectLst/>
+                        </a:rPr>
+                        <a:t>NPAT</a:t>
+                      </a:r>
+                    </a:p>
+                  </a:txBody>
+                  <a:tcPr anchor="ctr">
+                    <a:lnL>
+                      <a:noFill/>
+                    </a:lnL>
+                    <a:lnR>
+                      <a:noFill/>
+                    </a:lnR>
+                    <a:lnT>
+                      <a:noFill/>
+                    </a:lnT>
+                    <a:lnB>
+                      <a:noFill/>
+                    </a:lnB>
+                    <a:solidFill>
+                      <a:schemeClr val="bg1"/>
+                    </a:solidFill>
+                  </a:tcPr>
+                </a:tc>
+                <a:tc>
+                  <a:txBody>
+                    <a:bodyPr/>
+                    <a:lstStyle/>
+                    <a:p>
+                      <a:r>
+                        <a:rPr lang="en-US" sz="1200">
+                          <a:solidFill>
+                            <a:schemeClr val="tx1"/>
+                          </a:solidFill>
+                          <a:effectLst/>
+                        </a:rPr>
+                        <a:t>135</a:t>
+                      </a:r>
+                    </a:p>
+                  </a:txBody>
+                  <a:tcPr anchor="ctr">
+                    <a:lnL>
+                      <a:noFill/>
+                    </a:lnL>
+                    <a:lnR>
+                      <a:noFill/>
+                    </a:lnR>
+                    <a:lnT>
+                      <a:noFill/>
+                    </a:lnT>
+                    <a:lnB>
+                      <a:noFill/>
+                    </a:lnB>
+                    <a:solidFill>
+                      <a:schemeClr val="bg1"/>
+                    </a:solidFill>
+                  </a:tcPr>
+                </a:tc>
+                <a:tc>
+                  <a:txBody>
+                    <a:bodyPr/>
+                    <a:lstStyle/>
+                    <a:p>
+                      <a:r>
+                        <a:rPr lang="en-US" sz="1200">
+                          <a:solidFill>
+                            <a:schemeClr val="tx1"/>
+                          </a:solidFill>
+                          <a:effectLst/>
+                        </a:rPr>
+                        <a:t>153</a:t>
+                      </a:r>
+                    </a:p>
+                  </a:txBody>
+                  <a:tcPr anchor="ctr">
+                    <a:lnL>
+                      <a:noFill/>
+                    </a:lnL>
+                    <a:lnR>
+                      <a:noFill/>
+                    </a:lnR>
+                    <a:lnT>
+                      <a:noFill/>
+                    </a:lnT>
+                    <a:lnB>
+                      <a:noFill/>
+                    </a:lnB>
+                    <a:solidFill>
+                      <a:schemeClr val="bg1"/>
+                    </a:solidFill>
+                  </a:tcPr>
+                </a:tc>
+                <a:tc>
+                  <a:txBody>
+                    <a:bodyPr/>
+                    <a:lstStyle/>
+                    <a:p>
+                      <a:r>
+                        <a:rPr lang="en-US" sz="1200">
+                          <a:solidFill>
+                            <a:schemeClr val="tx1"/>
+                          </a:solidFill>
+                          <a:effectLst/>
+                        </a:rPr>
+                        <a:t>193</a:t>
+                      </a:r>
+                    </a:p>
+                  </a:txBody>
+                  <a:tcPr anchor="ctr">
+                    <a:lnL>
+                      <a:noFill/>
+                    </a:lnL>
+                    <a:lnR>
+                      <a:noFill/>
+                    </a:lnR>
+                    <a:lnT>
+                      <a:noFill/>
+                    </a:lnT>
+                    <a:lnB>
+                      <a:noFill/>
+                    </a:lnB>
+                    <a:solidFill>
+                      <a:schemeClr val="bg1"/>
+                    </a:solidFill>
+                  </a:tcPr>
+                </a:tc>
+                <a:extLst>
+                  <a:ext uri="{0D108BD9-81ED-4DB2-BD59-A6C34878D82A}">
+                    <a16:rowId xmlns:a16="http://schemas.microsoft.com/office/drawing/2014/main" val="2741223146"/>
+                  </a:ext>
+                </a:extLst>
+              </a:tr>
+              <a:tr h="485141">
+                <a:tc>
+                  <a:txBody>
+                    <a:bodyPr/>
+                    <a:lstStyle/>
+                    <a:p>
+                      <a:r>
+                        <a:rPr lang="en-US" sz="1200" b="1">
+                          <a:solidFill>
+                            <a:schemeClr val="tx1"/>
+                          </a:solidFill>
+                          <a:effectLst/>
+                        </a:rPr>
+                        <a:t>EBITDA Margin</a:t>
+                      </a:r>
+                      <a:endParaRPr lang="en-US" sz="1200">
+                        <a:solidFill>
+                          <a:schemeClr val="tx1"/>
+                        </a:solidFill>
+                        <a:effectLst/>
+                      </a:endParaRPr>
+                    </a:p>
+                  </a:txBody>
+                  <a:tcPr anchor="ctr">
+                    <a:lnL>
+                      <a:noFill/>
+                    </a:lnL>
+                    <a:lnR>
+                      <a:noFill/>
+                    </a:lnR>
+                    <a:lnT>
+                      <a:noFill/>
+                    </a:lnT>
+                    <a:lnB>
+                      <a:noFill/>
+                    </a:lnB>
+                    <a:solidFill>
+                      <a:schemeClr val="bg1"/>
+                    </a:solidFill>
+                  </a:tcPr>
+                </a:tc>
+                <a:tc>
+                  <a:txBody>
+                    <a:bodyPr/>
+                    <a:lstStyle/>
+                    <a:p>
+                      <a:r>
+                        <a:rPr lang="en-US" sz="1200">
+                          <a:solidFill>
+                            <a:schemeClr val="tx1"/>
+                          </a:solidFill>
+                          <a:effectLst/>
+                        </a:rPr>
+                        <a:t>25.0%</a:t>
+                      </a:r>
+                    </a:p>
+                  </a:txBody>
+                  <a:tcPr anchor="ctr">
+                    <a:lnL>
+                      <a:noFill/>
+                    </a:lnL>
+                    <a:lnR>
+                      <a:noFill/>
+                    </a:lnR>
+                    <a:lnT>
+                      <a:noFill/>
+                    </a:lnT>
+                    <a:lnB>
+                      <a:noFill/>
+                    </a:lnB>
+                    <a:solidFill>
+                      <a:schemeClr val="bg1"/>
+                    </a:solidFill>
+                  </a:tcPr>
+                </a:tc>
+                <a:tc>
+                  <a:txBody>
+                    <a:bodyPr/>
+                    <a:lstStyle/>
+                    <a:p>
+                      <a:r>
+                        <a:rPr lang="en-US" sz="1200">
+                          <a:solidFill>
+                            <a:schemeClr val="tx1"/>
+                          </a:solidFill>
+                          <a:effectLst/>
+                        </a:rPr>
+                        <a:t>26.0%</a:t>
+                      </a:r>
+                    </a:p>
+                  </a:txBody>
+                  <a:tcPr anchor="ctr">
+                    <a:lnL>
+                      <a:noFill/>
+                    </a:lnL>
+                    <a:lnR>
+                      <a:noFill/>
+                    </a:lnR>
+                    <a:lnT>
+                      <a:noFill/>
+                    </a:lnT>
+                    <a:lnB>
+                      <a:noFill/>
+                    </a:lnB>
+                    <a:solidFill>
+                      <a:schemeClr val="bg1"/>
+                    </a:solidFill>
+                  </a:tcPr>
+                </a:tc>
+                <a:tc>
+                  <a:txBody>
+                    <a:bodyPr/>
+                    <a:lstStyle/>
+                    <a:p>
+                      <a:r>
+                        <a:rPr lang="en-US" sz="1200">
+                          <a:solidFill>
+                            <a:schemeClr val="tx1"/>
+                          </a:solidFill>
+                          <a:effectLst/>
+                        </a:rPr>
+                        <a:t>28.0%</a:t>
+                      </a:r>
+                    </a:p>
+                  </a:txBody>
+                  <a:tcPr anchor="ctr">
+                    <a:lnL>
+                      <a:noFill/>
+                    </a:lnL>
+                    <a:lnR>
+                      <a:noFill/>
+                    </a:lnR>
+                    <a:lnT>
+                      <a:noFill/>
+                    </a:lnT>
+                    <a:lnB>
+                      <a:noFill/>
+                    </a:lnB>
+                    <a:solidFill>
+                      <a:schemeClr val="bg1"/>
+                    </a:solidFill>
+                  </a:tcPr>
+                </a:tc>
+                <a:extLst>
+                  <a:ext uri="{0D108BD9-81ED-4DB2-BD59-A6C34878D82A}">
+                    <a16:rowId xmlns:a16="http://schemas.microsoft.com/office/drawing/2014/main" val="3181054624"/>
+                  </a:ext>
+                </a:extLst>
+              </a:tr>
+              <a:tr h="485141">
+                <a:tc>
+                  <a:txBody>
+                    <a:bodyPr/>
+                    <a:lstStyle/>
+                    <a:p>
+                      <a:r>
+                        <a:rPr lang="en-US" sz="1200" b="1">
+                          <a:solidFill>
+                            <a:schemeClr val="tx1"/>
+                          </a:solidFill>
+                          <a:effectLst/>
+                        </a:rPr>
+                        <a:t>Net Profit Margin</a:t>
+                      </a:r>
+                      <a:endParaRPr lang="en-US" sz="1200">
+                        <a:solidFill>
+                          <a:schemeClr val="tx1"/>
+                        </a:solidFill>
+                        <a:effectLst/>
+                      </a:endParaRPr>
+                    </a:p>
+                  </a:txBody>
+                  <a:tcPr anchor="ctr">
+                    <a:lnL>
+                      <a:noFill/>
+                    </a:lnL>
+                    <a:lnR>
+                      <a:noFill/>
+                    </a:lnR>
+                    <a:lnT>
+                      <a:noFill/>
+                    </a:lnT>
+                    <a:lnB>
+                      <a:noFill/>
+                    </a:lnB>
+                    <a:solidFill>
+                      <a:schemeClr val="bg1"/>
+                    </a:solidFill>
+                  </a:tcPr>
+                </a:tc>
+                <a:tc>
+                  <a:txBody>
+                    <a:bodyPr/>
+                    <a:lstStyle/>
+                    <a:p>
+                      <a:r>
+                        <a:rPr lang="en-US" sz="1200" dirty="0">
+                          <a:solidFill>
+                            <a:schemeClr val="tx1"/>
+                          </a:solidFill>
+                          <a:effectLst/>
+                        </a:rPr>
+                        <a:t>15.0%</a:t>
+                      </a:r>
+                    </a:p>
+                  </a:txBody>
+                  <a:tcPr anchor="ctr">
+                    <a:lnL>
+                      <a:noFill/>
+                    </a:lnL>
+                    <a:lnR>
+                      <a:noFill/>
+                    </a:lnR>
+                    <a:lnT>
+                      <a:noFill/>
+                    </a:lnT>
+                    <a:lnB>
+                      <a:noFill/>
+                    </a:lnB>
+                    <a:solidFill>
+                      <a:schemeClr val="bg1"/>
+                    </a:solidFill>
+                  </a:tcPr>
+                </a:tc>
+                <a:tc>
+                  <a:txBody>
+                    <a:bodyPr/>
+                    <a:lstStyle/>
+                    <a:p>
+                      <a:r>
+                        <a:rPr lang="en-US" sz="1200">
+                          <a:solidFill>
+                            <a:schemeClr val="tx1"/>
+                          </a:solidFill>
+                          <a:effectLst/>
+                        </a:rPr>
+                        <a:t>15.9%</a:t>
+                      </a:r>
+                    </a:p>
+                  </a:txBody>
+                  <a:tcPr anchor="ctr">
+                    <a:lnL>
+                      <a:noFill/>
+                    </a:lnL>
+                    <a:lnR>
+                      <a:noFill/>
+                    </a:lnR>
+                    <a:lnT>
+                      <a:noFill/>
+                    </a:lnT>
+                    <a:lnB>
+                      <a:noFill/>
+                    </a:lnB>
+                    <a:solidFill>
+                      <a:schemeClr val="bg1"/>
+                    </a:solidFill>
+                  </a:tcPr>
+                </a:tc>
+                <a:tc>
+                  <a:txBody>
+                    <a:bodyPr/>
+                    <a:lstStyle/>
+                    <a:p>
+                      <a:r>
+                        <a:rPr lang="en-US" sz="1200" dirty="0">
+                          <a:solidFill>
+                            <a:schemeClr val="tx1"/>
+                          </a:solidFill>
+                          <a:effectLst/>
+                        </a:rPr>
+                        <a:t>18.0%</a:t>
+                      </a:r>
+                    </a:p>
+                  </a:txBody>
+                  <a:tcPr anchor="ctr">
+                    <a:lnL>
+                      <a:noFill/>
+                    </a:lnL>
+                    <a:lnR>
+                      <a:noFill/>
+                    </a:lnR>
+                    <a:lnT>
+                      <a:noFill/>
+                    </a:lnT>
+                    <a:lnB>
+                      <a:noFill/>
+                    </a:lnB>
+                    <a:solidFill>
+                      <a:schemeClr val="bg1"/>
+                    </a:solidFill>
+                  </a:tcPr>
+                </a:tc>
+                <a:extLst>
+                  <a:ext uri="{0D108BD9-81ED-4DB2-BD59-A6C34878D82A}">
+                    <a16:rowId xmlns:a16="http://schemas.microsoft.com/office/drawing/2014/main" val="3608016194"/>
+                  </a:ext>
+                </a:extLst>
+              </a:tr>
+            </a:tbl>
+          </a:graphicData>
+        </a:graphic>
+      </p:graphicFrame>
+      <p:sp>
+        <p:nvSpPr>
+          <p:cNvPr id="73" name="Rectangle 1">
+            <a:extLst>
+              <a:ext uri="{FF2B5EF4-FFF2-40B4-BE49-F238E27FC236}">
+                <a16:creationId xmlns:a16="http://schemas.microsoft.com/office/drawing/2014/main" id="{96468B13-5CAF-1EE7-053A-18E47DB51858}"/>
+              </a:ext>
+            </a:extLst>
+          </p:cNvPr>
+          <p:cNvSpPr>
+            <a:spLocks noChangeArrowheads="1"/>
+          </p:cNvSpPr>
+          <p:nvPr/>
+        </p:nvSpPr>
+        <p:spPr bwMode="auto">
+          <a:xfrm>
+            <a:off x="6281295" y="1769154"/>
+            <a:ext cx="5478424" cy="646331"/>
+          </a:xfrm>
+          <a:prstGeom prst="rect">
+            <a:avLst/>
+          </a:prstGeom>
+          <a:noFill/>
+          <a:ln>
+            <a:noFill/>
+          </a:ln>
+          <a:effectLst/>
+          <a:extLst>
+            <a:ext uri="{909E8E84-426E-40DD-AFC4-6F175D3DCCD1}">
+              <a14:hiddenFill xmlns:a14="http://schemas.microsoft.com/office/drawing/2010/main">
+                <a:solidFill>
+                  <a:schemeClr val="accent1"/>
+                </a:solidFill>
+              </a14:hiddenFill>
+            </a:ext>
+            <a:ext uri="{91240B29-F687-4F45-9708-019B960494DF}">
+              <a14:hiddenLine xmlns:a14="http://schemas.microsoft.com/office/drawing/2010/main" w="9525">
+                <a:solidFill>
+                  <a:schemeClr val="tx1"/>
+                </a:solidFill>
+                <a:miter lim="800000"/>
+                <a:headEnd/>
+                <a:tailEnd/>
+              </a14:hiddenLine>
+            </a:ext>
+            <a:ext uri="{AF507438-7753-43E0-B8FC-AC1667EBCBE1}">
+              <a14:hiddenEffects xmlns:a14="http://schemas.microsoft.com/office/drawing/2010/main">
+                <a:effectLst>
+                  <a:outerShdw dist="35921" dir="2700000" algn="ctr" rotWithShape="0">
+                    <a:schemeClr val="bg2"/>
+                  </a:outerShdw>
+                </a:effectLst>
+              </a14:hiddenEffects>
+            </a:ext>
+          </a:extLst>
+        </p:spPr>
+        <p:txBody>
+          <a:bodyPr vert="horz" wrap="square" lIns="91440" tIns="45720" rIns="91440" bIns="45720" numCol="1" anchor="ctr" anchorCtr="0" compatLnSpc="1">
+            <a:prstTxWarp prst="textNoShape">
+              <a:avLst/>
+            </a:prstTxWarp>
+            <a:spAutoFit/>
+          </a:bodyPr>
+          <a:lstStyle/>
+          <a:p>
+            <a:pPr marL="0" marR="0" lvl="0" indent="0" algn="l" defTabSz="914400" rtl="0" eaLnBrk="0" fontAlgn="base" latinLnBrk="0" hangingPunct="0">
+              <a:lnSpc>
+                <a:spcPct val="100000"/>
+              </a:lnSpc>
+              <a:spcBef>
+                <a:spcPct val="0"/>
+              </a:spcBef>
+              <a:spcAft>
+                <a:spcPct val="0"/>
+              </a:spcAft>
+              <a:buClrTx/>
+              <a:buSzTx/>
+              <a:buFontTx/>
+              <a:buNone/>
+              <a:tabLst/>
+            </a:pPr>
+            <a:br>
+              <a:rPr kumimoji="0" lang="en-US" altLang="en-US" sz="1800" b="0" i="0" u="none" strike="noStrike" cap="none" normalizeH="0" baseline="0">
+                <a:ln>
+                  <a:noFill/>
+                </a:ln>
+                <a:solidFill>
+                  <a:schemeClr val="tx1"/>
+                </a:solidFill>
+                <a:effectLst/>
+                <a:latin typeface="Arial" panose="020B0604020202020204" pitchFamily="34" charset="0"/>
+              </a:rPr>
+            </a:br>
+            <a:endParaRPr kumimoji="0" lang="en-US" altLang="en-US" sz="1800" b="0" i="0" u="none" strike="noStrike" cap="none" normalizeH="0" baseline="0">
+              <a:ln>
+                <a:noFill/>
+              </a:ln>
+              <a:solidFill>
+                <a:schemeClr val="tx1"/>
+              </a:solidFill>
+              <a:effectLst/>
+              <a:latin typeface="Arial" panose="020B0604020202020204" pitchFamily="34" charset="0"/>
+            </a:endParaRPr>
           </a:p>
         </p:txBody>
       </p:sp>
@@ -11798,6 +13317,11 @@
             <p:custDataLst>
               <p:tags r:id="rId2"/>
             </p:custDataLst>
+            <p:extLst>
+              <p:ext uri="{D42A27DB-BD31-4B8C-83A1-F6EECF244321}">
+                <p14:modId xmlns:p14="http://schemas.microsoft.com/office/powerpoint/2010/main" val="545779352"/>
+              </p:ext>
+            </p:extLst>
           </p:nvPr>
         </p:nvGraphicFramePr>
         <p:xfrm>
@@ -12009,6 +13533,49 @@
                     <a:bodyPr/>
                     <a:lstStyle/>
                     <a:p>
+                      <a:pPr marL="0" marR="0" lvl="0" indent="0" algn="l" defTabSz="914400" rtl="0" eaLnBrk="1" fontAlgn="b" latinLnBrk="0" hangingPunct="1">
+                        <a:lnSpc>
+                          <a:spcPct val="100000"/>
+                        </a:lnSpc>
+                        <a:spcBef>
+                          <a:spcPts val="265"/>
+                        </a:spcBef>
+                        <a:spcAft>
+                          <a:spcPts val="300"/>
+                        </a:spcAft>
+                        <a:buClrTx/>
+                        <a:buSzTx/>
+                        <a:buFontTx/>
+                        <a:buNone/>
+                        <a:tabLst/>
+                        <a:defRPr/>
+                      </a:pPr>
+                      <a:r>
+                        <a:rPr lang="en-US" sz="900" b="1" i="0" kern="1200" dirty="0">
+                          <a:solidFill>
+                            <a:schemeClr val="tx2"/>
+                          </a:solidFill>
+                          <a:effectLst/>
+                          <a:latin typeface="+mn-lt"/>
+                          <a:ea typeface="+mn-ea"/>
+                          <a:cs typeface="+mn-cs"/>
+                        </a:rPr>
+                        <a:t>Indicative Bid Deadline:</a:t>
+                      </a:r>
+                      <a:r>
+                        <a:rPr lang="en-US" sz="900" b="0" i="0" kern="1200" dirty="0">
+                          <a:solidFill>
+                            <a:schemeClr val="tx2"/>
+                          </a:solidFill>
+                          <a:effectLst/>
+                          <a:latin typeface="+mn-lt"/>
+                          <a:ea typeface="+mn-ea"/>
+                          <a:cs typeface="+mn-cs"/>
+                        </a:rPr>
+                        <a:t> May 13, 2020.</a:t>
+                      </a:r>
+                    </a:p>
+                    <a:p>
                       <a:pPr marL="0" indent="0" algn="l">
                         <a:spcAft>
                           <a:spcPts val="300"/>
@@ -12041,6 +13608,37 @@
                     <a:bodyPr/>
                     <a:lstStyle/>
                     <a:p>
+                      <a:pPr marL="0" marR="0" lvl="0" indent="0" algn="l" defTabSz="914400" rtl="0" eaLnBrk="1" fontAlgn="b" latinLnBrk="0" hangingPunct="1">
+                        <a:lnSpc>
+                          <a:spcPct val="100000"/>
+                        </a:lnSpc>
+                        <a:spcBef>
+                          <a:spcPts val="265"/>
+                        </a:spcBef>
+                        <a:spcAft>
+                          <a:spcPts val="300"/>
+                        </a:spcAft>
+                        <a:buClrTx/>
+                        <a:buSzTx/>
+                        <a:buFontTx/>
+                        <a:buNone/>
+                        <a:tabLst/>
+                        <a:defRPr/>
+                      </a:pPr>
+                      <a:r>
+                        <a:rPr lang="en-US" sz="900" b="0" i="0" kern="1200" dirty="0">
+                          <a:solidFill>
+                            <a:schemeClr val="tx2"/>
+                          </a:solidFill>
+                          <a:effectLst/>
+                          <a:latin typeface="+mn-lt"/>
+                          <a:ea typeface="+mn-ea"/>
+                          <a:cs typeface="+mn-cs"/>
+                        </a:rPr>
+                        <a:t>Access to Information Memorandum, vendor due diligence reports, and financial forecasts (released on Mar 19, 2020).</a:t>
+                      </a:r>
+                    </a:p>
+                    <a:p>
                       <a:pPr marL="0" indent="0" algn="l">
                         <a:spcAft>
                           <a:spcPts val="300"/>
@@ -12072,6 +13670,39 @@
                   <a:txBody>
                     <a:bodyPr/>
                     <a:lstStyle/>
+                    <a:p>
+                      <a:pPr marL="0" marR="0" lvl="1" indent="0" algn="l" defTabSz="914400" rtl="0" eaLnBrk="1" fontAlgn="b" latinLnBrk="0" hangingPunct="1">
+                        <a:lnSpc>
+                          <a:spcPct val="110000"/>
+                        </a:lnSpc>
+                        <a:spcBef>
+                          <a:spcPts val="265"/>
+                        </a:spcBef>
+                        <a:spcAft>
+                          <a:spcPct val="0"/>
+                        </a:spcAft>
+                        <a:buClr>
+                          <a:schemeClr val="bg2"/>
+                        </a:buClr>
+                        <a:buSzPct val="92000"/>
+                        <a:buFont typeface="Wingdings" panose="05000000000000000000" pitchFamily="2" charset="2"/>
+                        <a:buNone/>
+                        <a:tabLst/>
+                        <a:defRPr/>
+                      </a:pPr>
+                      <a:r>
+                        <a:rPr lang="en-US" sz="900" b="0" i="0" kern="1200" dirty="0">
+                          <a:solidFill>
+                            <a:schemeClr val="tx2"/>
+                          </a:solidFill>
+                          <a:effectLst/>
+                          <a:latin typeface="+mn-lt"/>
+                          <a:ea typeface="+mn-ea"/>
+                          <a:cs typeface="+mn-cs"/>
+                        </a:rPr>
+                        <a:t>Submit up to 20 questions by Apr 13, 2020.</a:t>
+                      </a:r>
+                    </a:p>
                     <a:p>
                       <a:pPr marL="0" lvl="1" indent="0" algn="l" defTabSz="914400" rtl="0" eaLnBrk="1" fontAlgn="b" latinLnBrk="0" hangingPunct="1">
                         <a:lnSpc>
@@ -12470,6 +14101,49 @@
                     <a:bodyPr/>
                     <a:lstStyle/>
                     <a:p>
+                      <a:pPr marL="0" marR="0" lvl="0" indent="0" algn="l" defTabSz="914400" rtl="0" eaLnBrk="1" fontAlgn="b" latinLnBrk="0" hangingPunct="1">
+                        <a:lnSpc>
+                          <a:spcPct val="100000"/>
+                        </a:lnSpc>
+                        <a:spcBef>
+                          <a:spcPts val="265"/>
+                        </a:spcBef>
+                        <a:spcAft>
+                          <a:spcPts val="300"/>
+                        </a:spcAft>
+                        <a:buClrTx/>
+                        <a:buSzTx/>
+                        <a:buFontTx/>
+                        <a:buNone/>
+                        <a:tabLst/>
+                        <a:defRPr/>
+                      </a:pPr>
+                      <a:r>
+                        <a:rPr lang="en-US" sz="900" b="1" i="0" kern="1200" dirty="0">
+                          <a:solidFill>
+                            <a:schemeClr val="tx2"/>
+                          </a:solidFill>
+                          <a:effectLst/>
+                          <a:latin typeface="+mn-lt"/>
+                          <a:ea typeface="+mn-ea"/>
+                          <a:cs typeface="+mn-cs"/>
+                        </a:rPr>
+                        <a:t>Final Bid Deadline:</a:t>
+                      </a:r>
+                      <a:r>
+                        <a:rPr lang="en-US" sz="900" b="0" i="0" kern="1200" dirty="0">
+                          <a:solidFill>
+                            <a:schemeClr val="tx2"/>
+                          </a:solidFill>
+                          <a:effectLst/>
+                          <a:latin typeface="+mn-lt"/>
+                          <a:ea typeface="+mn-ea"/>
+                          <a:cs typeface="+mn-cs"/>
+                        </a:rPr>
+                        <a:t> Late July 2020.</a:t>
+                      </a:r>
+                    </a:p>
+                    <a:p>
                       <a:pPr marL="0" indent="0" algn="l">
                         <a:spcAft>
                           <a:spcPts val="300"/>
@@ -12510,6 +14184,37 @@
                     <a:bodyPr/>
                     <a:lstStyle/>
                     <a:p>
+                      <a:pPr marL="0" marR="0" lvl="0" indent="0" algn="l" defTabSz="914400" rtl="0" eaLnBrk="1" fontAlgn="b" latinLnBrk="0" hangingPunct="1">
+                        <a:lnSpc>
+                          <a:spcPct val="100000"/>
+                        </a:lnSpc>
+                        <a:spcBef>
+                          <a:spcPts val="265"/>
+                        </a:spcBef>
+                        <a:spcAft>
+                          <a:spcPts val="300"/>
+                        </a:spcAft>
+                        <a:buClrTx/>
+                        <a:buSzTx/>
+                        <a:buFontTx/>
+                        <a:buNone/>
+                        <a:tabLst/>
+                        <a:defRPr/>
+                      </a:pPr>
+                      <a:r>
+                        <a:rPr lang="en-US" sz="900" b="0" i="0" kern="1200" dirty="0">
+                          <a:solidFill>
+                            <a:schemeClr val="tx2"/>
+                          </a:solidFill>
+                          <a:effectLst/>
+                          <a:latin typeface="+mn-lt"/>
+                          <a:ea typeface="+mn-ea"/>
+                          <a:cs typeface="+mn-cs"/>
+                        </a:rPr>
+                        <a:t>Shortlisted bidders will be invited to submit legally binding bids.</a:t>
+                      </a:r>
+                    </a:p>
+                    <a:p>
                       <a:pPr marL="0" indent="0" algn="l">
                         <a:spcAft>
                           <a:spcPts val="300"/>
@@ -12549,6 +14254,39 @@
                   <a:txBody>
                     <a:bodyPr/>
                     <a:lstStyle/>
+                    <a:p>
+                      <a:pPr marL="0" marR="0" lvl="1" indent="0" algn="l" defTabSz="914400" rtl="0" eaLnBrk="1" fontAlgn="b" latinLnBrk="0" hangingPunct="1">
+                        <a:lnSpc>
+                          <a:spcPct val="110000"/>
+                        </a:lnSpc>
+                        <a:spcBef>
+                          <a:spcPts val="265"/>
+                        </a:spcBef>
+                        <a:spcAft>
+                          <a:spcPct val="0"/>
+                        </a:spcAft>
+                        <a:buClr>
+                          <a:schemeClr val="bg2"/>
+                        </a:buClr>
+                        <a:buSzPct val="92000"/>
+                        <a:buFont typeface="Wingdings" panose="05000000000000000000" pitchFamily="2" charset="2"/>
+                        <a:buNone/>
+                        <a:tabLst/>
+                        <a:defRPr/>
+                      </a:pPr>
+                      <a:r>
+                        <a:rPr lang="en-US" sz="900" b="0" i="0" kern="1200" dirty="0">
+                          <a:solidFill>
+                            <a:schemeClr val="tx2"/>
+                          </a:solidFill>
+                          <a:effectLst/>
+                          <a:latin typeface="+mn-lt"/>
+                          <a:ea typeface="+mn-ea"/>
+                          <a:cs typeface="+mn-cs"/>
+                        </a:rPr>
+                        <a:t>Access to additional due diligence materials, site visits, and management presentations.</a:t>
+                      </a:r>
+                    </a:p>
                     <a:p>
                       <a:pPr marL="0" marR="0" lvl="1" indent="0" algn="l" defTabSz="914400" rtl="0" eaLnBrk="1" fontAlgn="b" latinLnBrk="0" hangingPunct="1">
                         <a:lnSpc>
@@ -12918,13 +14656,34 @@
 
 <file path=ppt/tags/tag13.xml><?xml version="1.0" encoding="utf-8"?>
 <p:tagLst xmlns:a="http://schemas.openxmlformats.org/drawingml/2006/main" xmlns:r="http://schemas.openxmlformats.org/officeDocument/2006/relationships" xmlns:p="http://schemas.openxmlformats.org/presentationml/2006/main">
+  <p:tag name="OBJECTTITLESHAPEID" val="13"/>
+  <p:tag name="THISSHAPESIZEANDPOSITIONDETAILS" val="top=149.04&amp;left=62.64&amp;height=154.8&amp;width=336.96"/>
+</p:tagLst>
+</file>
+
+<file path=ppt/tags/tag14.xml><?xml version="1.0" encoding="utf-8"?>
+<p:tagLst xmlns:a="http://schemas.openxmlformats.org/drawingml/2006/main" xmlns:r="http://schemas.openxmlformats.org/officeDocument/2006/relationships" xmlns:p="http://schemas.openxmlformats.org/presentationml/2006/main">
+  <p:tag name="OBJECTTITLESHAPEID" val="13"/>
+  <p:tag name="THISSHAPESIZEANDPOSITIONDETAILS" val="top=149.04&amp;left=62.64&amp;height=154.8&amp;width=336.96"/>
+</p:tagLst>
+</file>
+
+<file path=ppt/tags/tag15.xml><?xml version="1.0" encoding="utf-8"?>
+<p:tagLst xmlns:a="http://schemas.openxmlformats.org/drawingml/2006/main" xmlns:r="http://schemas.openxmlformats.org/officeDocument/2006/relationships" xmlns:p="http://schemas.openxmlformats.org/presentationml/2006/main">
+  <p:tag name="OBJECTTITLESHAPEID" val="13"/>
+  <p:tag name="THISSHAPESIZEANDPOSITIONDETAILS" val="top=149.04&amp;left=62.64&amp;height=154.8&amp;width=336.96"/>
+</p:tagLst>
+</file>
+
+<file path=ppt/tags/tag16.xml><?xml version="1.0" encoding="utf-8"?>
+<p:tagLst xmlns:a="http://schemas.openxmlformats.org/drawingml/2006/main" xmlns:r="http://schemas.openxmlformats.org/officeDocument/2006/relationships" xmlns:p="http://schemas.openxmlformats.org/presentationml/2006/main">
   <p:tag name="DISTRIBUTIONTYPE" val="External"/>
   <p:tag name="PITCHPROSLIDEID" val="256"/>
   <p:tag name="PRESENTATIONID" val="f6697a79-f97a-4327-b638-8b63a4884870"/>
 </p:tagLst>
 </file>
 
-<file path=ppt/tags/tag14.xml><?xml version="1.0" encoding="utf-8"?>
+<file path=ppt/tags/tag17.xml><?xml version="1.0" encoding="utf-8"?>
 <p:tagLst xmlns:a="http://schemas.openxmlformats.org/drawingml/2006/main" xmlns:r="http://schemas.openxmlformats.org/officeDocument/2006/relationships" xmlns:p="http://schemas.openxmlformats.org/presentationml/2006/main">
   <p:tag name="THISSHAPESIZEANDPOSITIONDETAILS" val="top=165.6&amp;left=37.44&amp;height=572.46&amp;width=717.12"/>
 </p:tagLst>

</xml_diff>